<commit_message>
final version of presenation alg
</commit_message>
<xml_diff>
--- a/Prezentace/PGM_01.pptx
+++ b/Prezentace/PGM_01.pptx
@@ -11,7 +11,10 @@
     <p:sldId id="267" r:id="rId5"/>
     <p:sldId id="268" r:id="rId6"/>
     <p:sldId id="269" r:id="rId7"/>
-    <p:sldId id="264" r:id="rId8"/>
+    <p:sldId id="270" r:id="rId8"/>
+    <p:sldId id="271" r:id="rId9"/>
+    <p:sldId id="264" r:id="rId10"/>
+    <p:sldId id="272" r:id="rId11"/>
   </p:sldIdLst>
   <p:sldSz cx="12192000" cy="6858000"/>
   <p:notesSz cx="6858000" cy="9144000"/>
@@ -5855,6 +5858,116 @@
 </p:sld>
 </file>
 
+<file path=ppt/slides/slide10.xml><?xml version="1.0" encoding="utf-8"?>
+<p:sld xmlns:a="http://schemas.openxmlformats.org/drawingml/2006/main" xmlns:r="http://schemas.openxmlformats.org/officeDocument/2006/relationships" xmlns:p="http://schemas.openxmlformats.org/presentationml/2006/main">
+  <p:cSld>
+    <p:spTree>
+      <p:nvGrpSpPr>
+        <p:cNvPr id="1" name=""/>
+        <p:cNvGrpSpPr/>
+        <p:nvPr/>
+      </p:nvGrpSpPr>
+      <p:grpSpPr>
+        <a:xfrm>
+          <a:off x="0" y="0"/>
+          <a:ext cx="0" cy="0"/>
+          <a:chOff x="0" y="0"/>
+          <a:chExt cx="0" cy="0"/>
+        </a:xfrm>
+      </p:grpSpPr>
+      <p:sp>
+        <p:nvSpPr>
+          <p:cNvPr id="5" name="Nadpis 4">
+            <a:extLst>
+              <a:ext uri="{FF2B5EF4-FFF2-40B4-BE49-F238E27FC236}">
+                <a16:creationId xmlns:a16="http://schemas.microsoft.com/office/drawing/2014/main" id="{697F2A20-69E5-425E-A341-32B7605861F7}"/>
+              </a:ext>
+            </a:extLst>
+          </p:cNvPr>
+          <p:cNvSpPr>
+            <a:spLocks noGrp="1"/>
+          </p:cNvSpPr>
+          <p:nvPr>
+            <p:ph type="title"/>
+          </p:nvPr>
+        </p:nvSpPr>
+        <p:spPr/>
+        <p:txBody>
+          <a:bodyPr/>
+          <a:lstStyle/>
+          <a:p>
+            <a:r>
+              <a:rPr lang="cs-CZ" dirty="0"/>
+              <a:t>Vývojové diagramy procvičení</a:t>
+            </a:r>
+          </a:p>
+        </p:txBody>
+      </p:sp>
+      <p:sp>
+        <p:nvSpPr>
+          <p:cNvPr id="6" name="Zástupný obsah 5">
+            <a:extLst>
+              <a:ext uri="{FF2B5EF4-FFF2-40B4-BE49-F238E27FC236}">
+                <a16:creationId xmlns:a16="http://schemas.microsoft.com/office/drawing/2014/main" id="{7B70FB68-63E2-4CC7-8230-6E3F64FA4CA6}"/>
+              </a:ext>
+            </a:extLst>
+          </p:cNvPr>
+          <p:cNvSpPr>
+            <a:spLocks noGrp="1"/>
+          </p:cNvSpPr>
+          <p:nvPr>
+            <p:ph idx="1"/>
+          </p:nvPr>
+        </p:nvSpPr>
+        <p:spPr/>
+        <p:txBody>
+          <a:bodyPr/>
+          <a:lstStyle/>
+          <a:p>
+            <a:r>
+              <a:rPr lang="cs-CZ" dirty="0"/>
+              <a:t>Zatlučení hřebíku</a:t>
+            </a:r>
+          </a:p>
+          <a:p>
+            <a:r>
+              <a:rPr lang="cs-CZ" dirty="0"/>
+              <a:t>Přechod křižovatky se semaforem</a:t>
+            </a:r>
+          </a:p>
+          <a:p>
+            <a:r>
+              <a:rPr lang="cs-CZ" dirty="0"/>
+              <a:t>Zobrazení většího čísla ze dvou hodnot</a:t>
+            </a:r>
+          </a:p>
+          <a:p>
+            <a:r>
+              <a:rPr lang="cs-CZ" dirty="0"/>
+              <a:t>Rozhodnutí, zda lze zkonstruovat trojúhelník</a:t>
+            </a:r>
+          </a:p>
+          <a:p>
+            <a:r>
+              <a:rPr lang="cs-CZ" dirty="0"/>
+              <a:t>Prohození dvou proměnných</a:t>
+            </a:r>
+          </a:p>
+        </p:txBody>
+      </p:sp>
+    </p:spTree>
+    <p:extLst>
+      <p:ext uri="{BB962C8B-B14F-4D97-AF65-F5344CB8AC3E}">
+        <p14:creationId xmlns:p14="http://schemas.microsoft.com/office/powerpoint/2010/main" val="2543461585"/>
+      </p:ext>
+    </p:extLst>
+  </p:cSld>
+  <p:clrMapOvr>
+    <a:masterClrMapping/>
+  </p:clrMapOvr>
+</p:sld>
+</file>
+
 <file path=ppt/slides/slide2.xml><?xml version="1.0" encoding="utf-8"?>
 <p:sld xmlns:a="http://schemas.openxmlformats.org/drawingml/2006/main" xmlns:r="http://schemas.openxmlformats.org/officeDocument/2006/relationships" xmlns:p="http://schemas.openxmlformats.org/presentationml/2006/main">
   <p:cSld>
@@ -6425,19 +6538,14 @@
           <a:p>
             <a:r>
               <a:rPr lang="cs-CZ" dirty="0"/>
-              <a:t>Strukturovaná </a:t>
-            </a:r>
-            <a:r>
-              <a:rPr lang="cs-CZ" dirty="0" smtClean="0"/>
-              <a:t>proměnná</a:t>
-            </a:r>
-          </a:p>
-          <a:p>
-            <a:r>
-              <a:rPr lang="cs-CZ" dirty="0" smtClean="0"/>
+              <a:t>Strukturovaná proměnná</a:t>
+            </a:r>
+          </a:p>
+          <a:p>
+            <a:r>
+              <a:rPr lang="cs-CZ" dirty="0"/>
               <a:t>Hodnotu proměnné ukládáme přiřazovacím příkazem nebo příkazem vstupu</a:t>
             </a:r>
-            <a:endParaRPr lang="cs-CZ" dirty="0"/>
           </a:p>
           <a:p>
             <a:pPr marL="0" indent="0">
@@ -6493,29 +6601,64 @@
           <a:lstStyle/>
           <a:p>
             <a:r>
-              <a:rPr lang="cs-CZ" dirty="0" smtClean="0"/>
+              <a:rPr lang="cs-CZ" dirty="0"/>
               <a:t>Vývojový diagram</a:t>
             </a:r>
+          </a:p>
+        </p:txBody>
+      </p:sp>
+      <p:sp>
+        <p:nvSpPr>
+          <p:cNvPr id="3" name="Zástupný symbol pro obsah 2"/>
+          <p:cNvSpPr>
+            <a:spLocks noGrp="1"/>
+          </p:cNvSpPr>
+          <p:nvPr>
+            <p:ph idx="1"/>
+          </p:nvPr>
+        </p:nvSpPr>
+        <p:spPr/>
+        <p:txBody>
+          <a:bodyPr/>
+          <a:lstStyle/>
+          <a:p>
+            <a:r>
+              <a:rPr lang="cs-CZ" dirty="0"/>
+              <a:t>Grafické znázornění algoritmu</a:t>
+            </a:r>
+          </a:p>
+          <a:p>
+            <a:r>
+              <a:rPr lang="cs-CZ" dirty="0"/>
+              <a:t>Slouží k názornému představení konkrétního algoritmu a usnadňuje jeho pochopení</a:t>
+            </a:r>
+          </a:p>
+          <a:p>
+            <a:r>
+              <a:rPr lang="cs-CZ" dirty="0"/>
+              <a:t>Čteme a vytváříme směrem odshora dolů</a:t>
+            </a:r>
+          </a:p>
+          <a:p>
+            <a:r>
+              <a:rPr lang="cs-CZ" dirty="0"/>
+              <a:t>Šipky v diagramu představují směr</a:t>
+            </a:r>
+          </a:p>
+          <a:p>
+            <a:r>
+              <a:rPr lang="cs-CZ" dirty="0"/>
+              <a:t>Pro kreslení se dodržují ucelená pravidla a normy</a:t>
+            </a:r>
+          </a:p>
+          <a:p>
             <a:endParaRPr lang="cs-CZ" dirty="0"/>
           </a:p>
-        </p:txBody>
-      </p:sp>
-      <p:sp>
-        <p:nvSpPr>
-          <p:cNvPr id="3" name="Zástupný symbol pro obsah 2"/>
-          <p:cNvSpPr>
-            <a:spLocks noGrp="1"/>
-          </p:cNvSpPr>
-          <p:nvPr>
-            <p:ph idx="1"/>
-          </p:nvPr>
-        </p:nvSpPr>
-        <p:spPr/>
-        <p:txBody>
-          <a:bodyPr/>
-          <a:lstStyle/>
-          <a:p>
-            <a:endParaRPr lang="cs-CZ"/>
+          <a:p>
+            <a:pPr marL="0" indent="0">
+              <a:buNone/>
+            </a:pPr>
+            <a:endParaRPr lang="cs-CZ" dirty="0"/>
           </a:p>
         </p:txBody>
       </p:sp>
@@ -6533,6 +6676,181 @@
 </file>
 
 <file path=ppt/slides/slide7.xml><?xml version="1.0" encoding="utf-8"?>
+<p:sld xmlns:a="http://schemas.openxmlformats.org/drawingml/2006/main" xmlns:r="http://schemas.openxmlformats.org/officeDocument/2006/relationships" xmlns:p="http://schemas.openxmlformats.org/presentationml/2006/main">
+  <p:cSld>
+    <p:spTree>
+      <p:nvGrpSpPr>
+        <p:cNvPr id="1" name=""/>
+        <p:cNvGrpSpPr/>
+        <p:nvPr/>
+      </p:nvGrpSpPr>
+      <p:grpSpPr>
+        <a:xfrm>
+          <a:off x="0" y="0"/>
+          <a:ext cx="0" cy="0"/>
+          <a:chOff x="0" y="0"/>
+          <a:chExt cx="0" cy="0"/>
+        </a:xfrm>
+      </p:grpSpPr>
+      <p:sp>
+        <p:nvSpPr>
+          <p:cNvPr id="2" name="Nadpis 1">
+            <a:extLst>
+              <a:ext uri="{FF2B5EF4-FFF2-40B4-BE49-F238E27FC236}">
+                <a16:creationId xmlns:a16="http://schemas.microsoft.com/office/drawing/2014/main" id="{365C332C-0000-406C-A686-544781825A47}"/>
+              </a:ext>
+            </a:extLst>
+          </p:cNvPr>
+          <p:cNvSpPr>
+            <a:spLocks noGrp="1"/>
+          </p:cNvSpPr>
+          <p:nvPr>
+            <p:ph type="title"/>
+          </p:nvPr>
+        </p:nvSpPr>
+        <p:spPr/>
+        <p:txBody>
+          <a:bodyPr/>
+          <a:lstStyle/>
+          <a:p>
+            <a:r>
+              <a:rPr lang="cs-CZ" dirty="0"/>
+              <a:t>Vývojový diagram – používané značky</a:t>
+            </a:r>
+          </a:p>
+        </p:txBody>
+      </p:sp>
+      <p:pic>
+        <p:nvPicPr>
+          <p:cNvPr id="5" name="Zástupný obsah 4">
+            <a:extLst>
+              <a:ext uri="{FF2B5EF4-FFF2-40B4-BE49-F238E27FC236}">
+                <a16:creationId xmlns:a16="http://schemas.microsoft.com/office/drawing/2014/main" id="{09DF174E-FE8F-4064-A851-BB3855FFD59E}"/>
+              </a:ext>
+            </a:extLst>
+          </p:cNvPr>
+          <p:cNvPicPr>
+            <a:picLocks noGrp="1" noChangeAspect="1"/>
+          </p:cNvPicPr>
+          <p:nvPr>
+            <p:ph idx="1"/>
+          </p:nvPr>
+        </p:nvPicPr>
+        <p:blipFill>
+          <a:blip r:embed="rId2"/>
+          <a:stretch>
+            <a:fillRect/>
+          </a:stretch>
+        </p:blipFill>
+        <p:spPr>
+          <a:xfrm>
+            <a:off x="1266028" y="1448564"/>
+            <a:ext cx="7419280" cy="5375293"/>
+          </a:xfrm>
+        </p:spPr>
+      </p:pic>
+    </p:spTree>
+    <p:extLst>
+      <p:ext uri="{BB962C8B-B14F-4D97-AF65-F5344CB8AC3E}">
+        <p14:creationId xmlns:p14="http://schemas.microsoft.com/office/powerpoint/2010/main" val="2998362716"/>
+      </p:ext>
+    </p:extLst>
+  </p:cSld>
+  <p:clrMapOvr>
+    <a:masterClrMapping/>
+  </p:clrMapOvr>
+</p:sld>
+</file>
+
+<file path=ppt/slides/slide8.xml><?xml version="1.0" encoding="utf-8"?>
+<p:sld xmlns:a="http://schemas.openxmlformats.org/drawingml/2006/main" xmlns:r="http://schemas.openxmlformats.org/officeDocument/2006/relationships" xmlns:p="http://schemas.openxmlformats.org/presentationml/2006/main">
+  <p:cSld>
+    <p:spTree>
+      <p:nvGrpSpPr>
+        <p:cNvPr id="1" name=""/>
+        <p:cNvGrpSpPr/>
+        <p:nvPr/>
+      </p:nvGrpSpPr>
+      <p:grpSpPr>
+        <a:xfrm>
+          <a:off x="0" y="0"/>
+          <a:ext cx="0" cy="0"/>
+          <a:chOff x="0" y="0"/>
+          <a:chExt cx="0" cy="0"/>
+        </a:xfrm>
+      </p:grpSpPr>
+      <p:sp>
+        <p:nvSpPr>
+          <p:cNvPr id="2" name="Nadpis 1">
+            <a:extLst>
+              <a:ext uri="{FF2B5EF4-FFF2-40B4-BE49-F238E27FC236}">
+                <a16:creationId xmlns:a16="http://schemas.microsoft.com/office/drawing/2014/main" id="{01F8F671-3DF2-44F2-AB02-D5D4CFC4EC46}"/>
+              </a:ext>
+            </a:extLst>
+          </p:cNvPr>
+          <p:cNvSpPr>
+            <a:spLocks noGrp="1"/>
+          </p:cNvSpPr>
+          <p:nvPr>
+            <p:ph type="title"/>
+          </p:nvPr>
+        </p:nvSpPr>
+        <p:spPr/>
+        <p:txBody>
+          <a:bodyPr/>
+          <a:lstStyle/>
+          <a:p>
+            <a:r>
+              <a:rPr lang="cs-CZ"/>
+              <a:t>Vývojový diagram</a:t>
+            </a:r>
+            <a:endParaRPr lang="cs-CZ" dirty="0"/>
+          </a:p>
+        </p:txBody>
+      </p:sp>
+      <p:pic>
+        <p:nvPicPr>
+          <p:cNvPr id="5" name="Zástupný obsah 4">
+            <a:extLst>
+              <a:ext uri="{FF2B5EF4-FFF2-40B4-BE49-F238E27FC236}">
+                <a16:creationId xmlns:a16="http://schemas.microsoft.com/office/drawing/2014/main" id="{DBFDBB65-37F4-4AF7-9FE3-525404F39C91}"/>
+              </a:ext>
+            </a:extLst>
+          </p:cNvPr>
+          <p:cNvPicPr>
+            <a:picLocks noGrp="1" noChangeAspect="1"/>
+          </p:cNvPicPr>
+          <p:nvPr>
+            <p:ph idx="1"/>
+          </p:nvPr>
+        </p:nvPicPr>
+        <p:blipFill>
+          <a:blip r:embed="rId2"/>
+          <a:stretch>
+            <a:fillRect/>
+          </a:stretch>
+        </p:blipFill>
+        <p:spPr>
+          <a:xfrm>
+            <a:off x="2140004" y="1210039"/>
+            <a:ext cx="5669872" cy="5507256"/>
+          </a:xfrm>
+        </p:spPr>
+      </p:pic>
+    </p:spTree>
+    <p:extLst>
+      <p:ext uri="{BB962C8B-B14F-4D97-AF65-F5344CB8AC3E}">
+        <p14:creationId xmlns:p14="http://schemas.microsoft.com/office/powerpoint/2010/main" val="3924840111"/>
+      </p:ext>
+    </p:extLst>
+  </p:cSld>
+  <p:clrMapOvr>
+    <a:masterClrMapping/>
+  </p:clrMapOvr>
+</p:sld>
+</file>
+
+<file path=ppt/slides/slide9.xml><?xml version="1.0" encoding="utf-8"?>
 <p:sld xmlns:a="http://schemas.openxmlformats.org/drawingml/2006/main" xmlns:r="http://schemas.openxmlformats.org/officeDocument/2006/relationships" xmlns:p="http://schemas.openxmlformats.org/presentationml/2006/main">
   <p:cSld>
     <p:bg>
@@ -6587,21 +6905,10 @@
           <a:p>
             <a:pPr algn="ctr"/>
             <a:r>
-              <a:rPr lang="cs-CZ" sz="6600" dirty="0" err="1"/>
-              <a:t>Kahoot</a:t>
-            </a:r>
-            <a:r>
-              <a:rPr lang="cs-CZ" sz="6600" dirty="0"/>
-              <a:t> </a:t>
-            </a:r>
-            <a:r>
-              <a:rPr lang="cs-CZ" sz="6600" dirty="0" err="1"/>
-              <a:t>time</a:t>
-            </a:r>
-            <a:r>
-              <a:rPr lang="cs-CZ" sz="6600" dirty="0"/>
-              <a:t>!</a:t>
-            </a:r>
+              <a:rPr lang="cs-CZ" sz="6600"/>
+              <a:t>Kahoot time!</a:t>
+            </a:r>
+            <a:endParaRPr lang="cs-CZ" sz="6600" dirty="0"/>
           </a:p>
         </p:txBody>
       </p:sp>

</xml_diff>

<commit_message>
add presentation about programming language, update README
</commit_message>
<xml_diff>
--- a/Prezentace/PGM_01.pptx
+++ b/Prezentace/PGM_01.pptx
@@ -867,7 +867,7 @@
             <a:fld id="{B61BEF0D-F0BB-DE4B-95CE-6DB70DBA9567}" type="datetimeFigureOut">
               <a:rPr lang="en-US" dirty="0"/>
               <a:pPr/>
-              <a:t>9/1/2020</a:t>
+              <a:t>9/5/2020</a:t>
             </a:fld>
             <a:endParaRPr lang="en-US" dirty="0"/>
           </a:p>
@@ -1115,7 +1115,7 @@
             <a:fld id="{B61BEF0D-F0BB-DE4B-95CE-6DB70DBA9567}" type="datetimeFigureOut">
               <a:rPr lang="en-US" dirty="0"/>
               <a:pPr/>
-              <a:t>9/1/2020</a:t>
+              <a:t>9/5/2020</a:t>
             </a:fld>
             <a:endParaRPr lang="en-US" dirty="0"/>
           </a:p>
@@ -1426,7 +1426,7 @@
             <a:fld id="{B61BEF0D-F0BB-DE4B-95CE-6DB70DBA9567}" type="datetimeFigureOut">
               <a:rPr lang="en-US" dirty="0"/>
               <a:pPr/>
-              <a:t>9/1/2020</a:t>
+              <a:t>9/5/2020</a:t>
             </a:fld>
             <a:endParaRPr lang="en-US" dirty="0"/>
           </a:p>
@@ -1756,7 +1756,7 @@
             <a:fld id="{B61BEF0D-F0BB-DE4B-95CE-6DB70DBA9567}" type="datetimeFigureOut">
               <a:rPr lang="en-US" dirty="0"/>
               <a:pPr/>
-              <a:t>9/1/2020</a:t>
+              <a:t>9/5/2020</a:t>
             </a:fld>
             <a:endParaRPr lang="en-US" dirty="0"/>
           </a:p>
@@ -2067,7 +2067,7 @@
             <a:fld id="{B61BEF0D-F0BB-DE4B-95CE-6DB70DBA9567}" type="datetimeFigureOut">
               <a:rPr lang="en-US" dirty="0"/>
               <a:pPr/>
-              <a:t>9/1/2020</a:t>
+              <a:t>9/5/2020</a:t>
             </a:fld>
             <a:endParaRPr lang="en-US" dirty="0"/>
           </a:p>
@@ -2457,7 +2457,7 @@
             <a:fld id="{B61BEF0D-F0BB-DE4B-95CE-6DB70DBA9567}" type="datetimeFigureOut">
               <a:rPr lang="en-US" dirty="0"/>
               <a:pPr/>
-              <a:t>9/1/2020</a:t>
+              <a:t>9/5/2020</a:t>
             </a:fld>
             <a:endParaRPr lang="en-US" dirty="0"/>
           </a:p>
@@ -2623,7 +2623,7 @@
           <a:p>
             <a:fld id="{55C6B4A9-1611-4792-9094-5F34BCA07E0B}" type="datetimeFigureOut">
               <a:rPr lang="en-US" dirty="0"/>
-              <a:t>9/1/2020</a:t>
+              <a:t>9/5/2020</a:t>
             </a:fld>
             <a:endParaRPr lang="en-US" dirty="0"/>
           </a:p>
@@ -2799,7 +2799,7 @@
             <a:fld id="{B61BEF0D-F0BB-DE4B-95CE-6DB70DBA9567}" type="datetimeFigureOut">
               <a:rPr lang="en-US" dirty="0"/>
               <a:pPr/>
-              <a:t>9/1/2020</a:t>
+              <a:t>9/5/2020</a:t>
             </a:fld>
             <a:endParaRPr lang="en-US" dirty="0"/>
           </a:p>
@@ -2965,7 +2965,7 @@
           <a:p>
             <a:fld id="{42A54C80-263E-416B-A8E0-580EDEADCBDC}" type="datetimeFigureOut">
               <a:rPr lang="en-US" dirty="0"/>
-              <a:t>9/1/2020</a:t>
+              <a:t>9/5/2020</a:t>
             </a:fld>
             <a:endParaRPr lang="en-US" dirty="0"/>
           </a:p>
@@ -3208,7 +3208,7 @@
             <a:fld id="{B61BEF0D-F0BB-DE4B-95CE-6DB70DBA9567}" type="datetimeFigureOut">
               <a:rPr lang="en-US" dirty="0"/>
               <a:pPr/>
-              <a:t>9/1/2020</a:t>
+              <a:t>9/5/2020</a:t>
             </a:fld>
             <a:endParaRPr lang="en-US" dirty="0"/>
           </a:p>
@@ -3436,7 +3436,7 @@
           <a:p>
             <a:fld id="{42A54C80-263E-416B-A8E0-580EDEADCBDC}" type="datetimeFigureOut">
               <a:rPr lang="en-US" dirty="0"/>
-              <a:t>9/1/2020</a:t>
+              <a:t>9/5/2020</a:t>
             </a:fld>
             <a:endParaRPr lang="en-US" dirty="0"/>
           </a:p>
@@ -3806,7 +3806,7 @@
             <a:fld id="{B61BEF0D-F0BB-DE4B-95CE-6DB70DBA9567}" type="datetimeFigureOut">
               <a:rPr lang="en-US" dirty="0"/>
               <a:pPr/>
-              <a:t>9/1/2020</a:t>
+              <a:t>9/5/2020</a:t>
             </a:fld>
             <a:endParaRPr lang="en-US" dirty="0"/>
           </a:p>
@@ -3926,7 +3926,7 @@
             <a:fld id="{B61BEF0D-F0BB-DE4B-95CE-6DB70DBA9567}" type="datetimeFigureOut">
               <a:rPr lang="en-US" dirty="0"/>
               <a:pPr/>
-              <a:t>9/1/2020</a:t>
+              <a:t>9/5/2020</a:t>
             </a:fld>
             <a:endParaRPr lang="en-US" dirty="0"/>
           </a:p>
@@ -4018,7 +4018,7 @@
             <a:fld id="{B61BEF0D-F0BB-DE4B-95CE-6DB70DBA9567}" type="datetimeFigureOut">
               <a:rPr lang="en-US" dirty="0"/>
               <a:pPr/>
-              <a:t>9/1/2020</a:t>
+              <a:t>9/5/2020</a:t>
             </a:fld>
             <a:endParaRPr lang="en-US" dirty="0"/>
           </a:p>
@@ -4269,7 +4269,7 @@
           <a:p>
             <a:fld id="{42A54C80-263E-416B-A8E0-580EDEADCBDC}" type="datetimeFigureOut">
               <a:rPr lang="en-US" dirty="0"/>
-              <a:t>9/1/2020</a:t>
+              <a:t>9/5/2020</a:t>
             </a:fld>
             <a:endParaRPr lang="en-US" dirty="0"/>
           </a:p>
@@ -4571,7 +4571,7 @@
             <a:fld id="{B61BEF0D-F0BB-DE4B-95CE-6DB70DBA9567}" type="datetimeFigureOut">
               <a:rPr lang="en-US" dirty="0"/>
               <a:pPr/>
-              <a:t>9/1/2020</a:t>
+              <a:t>9/5/2020</a:t>
             </a:fld>
             <a:endParaRPr lang="en-US" dirty="0"/>
           </a:p>
@@ -5269,7 +5269,7 @@
             <a:fld id="{B61BEF0D-F0BB-DE4B-95CE-6DB70DBA9567}" type="datetimeFigureOut">
               <a:rPr lang="en-US" dirty="0"/>
               <a:pPr/>
-              <a:t>9/1/2020</a:t>
+              <a:t>9/5/2020</a:t>
             </a:fld>
             <a:endParaRPr lang="en-US" dirty="0"/>
           </a:p>
@@ -5840,7 +5840,7 @@
           <a:p>
             <a:r>
               <a:rPr lang="cs-CZ" dirty="0"/>
-              <a:t>Algoritmus, program, programovací jazyk, vývojové diagramy</a:t>
+              <a:t>Algoritmus, vývojové diagramy</a:t>
             </a:r>
           </a:p>
         </p:txBody>
@@ -6233,8 +6233,13 @@
             <a:pPr lvl="1"/>
             <a:r>
               <a:rPr lang="cs-CZ" dirty="0"/>
-              <a:t>Provedení algoritmu končí po konečném počtu koků</a:t>
-            </a:r>
+              <a:t>Provedení algoritmu končí po konečném </a:t>
+            </a:r>
+            <a:r>
+              <a:rPr lang="cs-CZ"/>
+              <a:t>počtu kroků</a:t>
+            </a:r>
+            <a:endParaRPr lang="cs-CZ" dirty="0"/>
           </a:p>
           <a:p>
             <a:r>

</xml_diff>